<commit_message>
revising * location of representation
</commit_message>
<xml_diff>
--- a/CLMN/Replay_Exp/blueprint/blueprint_0324.pptx
+++ b/CLMN/Replay_Exp/blueprint/blueprint_0324.pptx
@@ -5,9 +5,8 @@
     <p:sldMasterId id="2147483648" r:id="rId1"/>
   </p:sldMasterIdLst>
   <p:sldIdLst>
-    <p:sldId id="259" r:id="rId2"/>
-    <p:sldId id="257" r:id="rId3"/>
-    <p:sldId id="258" r:id="rId4"/>
+    <p:sldId id="257" r:id="rId2"/>
+    <p:sldId id="258" r:id="rId3"/>
   </p:sldIdLst>
   <p:sldSz cx="12192000" cy="6858000"/>
   <p:notesSz cx="6858000" cy="9144000"/>
@@ -3360,209 +3359,6 @@
           <a:chExt cx="0" cy="0"/>
         </a:xfrm>
       </p:grpSpPr>
-      <p:pic>
-        <p:nvPicPr>
-          <p:cNvPr id="2" name="0324_replay" descr="0324_replay">
-            <a:hlinkClick r:id="" action="ppaction://media"/>
-            <a:extLst>
-              <a:ext uri="{FF2B5EF4-FFF2-40B4-BE49-F238E27FC236}">
-                <a16:creationId xmlns:a16="http://schemas.microsoft.com/office/drawing/2014/main" id="{411F1ACE-0B99-E649-8AC2-B368EB4AFAE9}"/>
-              </a:ext>
-            </a:extLst>
-          </p:cNvPr>
-          <p:cNvPicPr>
-            <a:picLocks noChangeAspect="1"/>
-          </p:cNvPicPr>
-          <p:nvPr>
-            <a:videoFile r:link="rId2"/>
-            <p:extLst>
-              <p:ext uri="{DAA4B4D4-6D71-4841-9C94-3DE7FCFB9230}">
-                <p14:media xmlns:p14="http://schemas.microsoft.com/office/powerpoint/2010/main" r:embed="rId1"/>
-              </p:ext>
-            </p:extLst>
-          </p:nvPr>
-        </p:nvPicPr>
-        <p:blipFill>
-          <a:blip r:embed="rId4"/>
-          <a:stretch>
-            <a:fillRect/>
-          </a:stretch>
-        </p:blipFill>
-        <p:spPr>
-          <a:xfrm>
-            <a:off x="3071019" y="214989"/>
-            <a:ext cx="6122988" cy="6428021"/>
-          </a:xfrm>
-          <a:prstGeom prst="rect">
-            <a:avLst/>
-          </a:prstGeom>
-        </p:spPr>
-      </p:pic>
-    </p:spTree>
-    <p:extLst>
-      <p:ext uri="{BB962C8B-B14F-4D97-AF65-F5344CB8AC3E}">
-        <p14:creationId xmlns:p14="http://schemas.microsoft.com/office/powerpoint/2010/main" val="1339071332"/>
-      </p:ext>
-    </p:extLst>
-  </p:cSld>
-  <p:clrMapOvr>
-    <a:masterClrMapping/>
-  </p:clrMapOvr>
-  <p:timing>
-    <p:tnLst>
-      <p:par>
-        <p:cTn id="1" dur="indefinite" restart="never" nodeType="tmRoot">
-          <p:childTnLst>
-            <p:seq concurrent="1" nextAc="seek">
-              <p:cTn id="2" dur="indefinite" nodeType="mainSeq">
-                <p:childTnLst>
-                  <p:par>
-                    <p:cTn id="3" fill="hold">
-                      <p:stCondLst>
-                        <p:cond delay="indefinite"/>
-                      </p:stCondLst>
-                      <p:childTnLst>
-                        <p:par>
-                          <p:cTn id="4" fill="hold">
-                            <p:stCondLst>
-                              <p:cond delay="0"/>
-                            </p:stCondLst>
-                            <p:childTnLst>
-                              <p:par>
-                                <p:cTn id="5" presetID="1" presetClass="mediacall" presetSubtype="0" fill="hold" nodeType="clickEffect">
-                                  <p:stCondLst>
-                                    <p:cond delay="0"/>
-                                  </p:stCondLst>
-                                  <p:childTnLst>
-                                    <p:cmd type="call" cmd="playFrom(0.0)">
-                                      <p:cBhvr>
-                                        <p:cTn id="6" dur="83578" fill="hold"/>
-                                        <p:tgtEl>
-                                          <p:spTgt spid="2"/>
-                                        </p:tgtEl>
-                                      </p:cBhvr>
-                                    </p:cmd>
-                                  </p:childTnLst>
-                                </p:cTn>
-                              </p:par>
-                            </p:childTnLst>
-                          </p:cTn>
-                        </p:par>
-                      </p:childTnLst>
-                    </p:cTn>
-                  </p:par>
-                </p:childTnLst>
-              </p:cTn>
-              <p:prevCondLst>
-                <p:cond evt="onPrev" delay="0">
-                  <p:tgtEl>
-                    <p:sldTgt/>
-                  </p:tgtEl>
-                </p:cond>
-              </p:prevCondLst>
-              <p:nextCondLst>
-                <p:cond evt="onNext" delay="0">
-                  <p:tgtEl>
-                    <p:sldTgt/>
-                  </p:tgtEl>
-                </p:cond>
-              </p:nextCondLst>
-            </p:seq>
-            <p:video>
-              <p:cMediaNode vol="80000">
-                <p:cTn id="7" fill="hold" display="0">
-                  <p:stCondLst>
-                    <p:cond delay="indefinite"/>
-                  </p:stCondLst>
-                </p:cTn>
-                <p:tgtEl>
-                  <p:spTgt spid="2"/>
-                </p:tgtEl>
-              </p:cMediaNode>
-            </p:video>
-            <p:seq concurrent="1" nextAc="seek">
-              <p:cTn id="8" restart="whenNotActive" fill="hold" evtFilter="cancelBubble" nodeType="interactiveSeq">
-                <p:stCondLst>
-                  <p:cond evt="onClick" delay="0">
-                    <p:tgtEl>
-                      <p:spTgt spid="2"/>
-                    </p:tgtEl>
-                  </p:cond>
-                </p:stCondLst>
-                <p:endSync evt="end" delay="0">
-                  <p:rtn val="all"/>
-                </p:endSync>
-                <p:childTnLst>
-                  <p:par>
-                    <p:cTn id="9" fill="hold">
-                      <p:stCondLst>
-                        <p:cond delay="0"/>
-                      </p:stCondLst>
-                      <p:childTnLst>
-                        <p:par>
-                          <p:cTn id="10" fill="hold">
-                            <p:stCondLst>
-                              <p:cond delay="0"/>
-                            </p:stCondLst>
-                            <p:childTnLst>
-                              <p:par>
-                                <p:cTn id="11" presetID="2" presetClass="mediacall" presetSubtype="0" fill="hold" nodeType="clickEffect">
-                                  <p:stCondLst>
-                                    <p:cond delay="0"/>
-                                  </p:stCondLst>
-                                  <p:childTnLst>
-                                    <p:cmd type="call" cmd="togglePause">
-                                      <p:cBhvr>
-                                        <p:cTn id="12" dur="1" fill="hold"/>
-                                        <p:tgtEl>
-                                          <p:spTgt spid="2"/>
-                                        </p:tgtEl>
-                                      </p:cBhvr>
-                                    </p:cmd>
-                                  </p:childTnLst>
-                                </p:cTn>
-                              </p:par>
-                            </p:childTnLst>
-                          </p:cTn>
-                        </p:par>
-                      </p:childTnLst>
-                    </p:cTn>
-                  </p:par>
-                </p:childTnLst>
-              </p:cTn>
-              <p:nextCondLst>
-                <p:cond evt="onClick" delay="0">
-                  <p:tgtEl>
-                    <p:spTgt spid="2"/>
-                  </p:tgtEl>
-                </p:cond>
-              </p:nextCondLst>
-            </p:seq>
-          </p:childTnLst>
-        </p:cTn>
-      </p:par>
-    </p:tnLst>
-  </p:timing>
-</p:sld>
-</file>
-
-<file path=ppt/slides/slide2.xml><?xml version="1.0" encoding="utf-8"?>
-<p:sld xmlns:a="http://schemas.openxmlformats.org/drawingml/2006/main" xmlns:r="http://schemas.openxmlformats.org/officeDocument/2006/relationships" xmlns:p="http://schemas.openxmlformats.org/presentationml/2006/main">
-  <p:cSld>
-    <p:spTree>
-      <p:nvGrpSpPr>
-        <p:cNvPr id="1" name=""/>
-        <p:cNvGrpSpPr/>
-        <p:nvPr/>
-      </p:nvGrpSpPr>
-      <p:grpSpPr>
-        <a:xfrm>
-          <a:off x="0" y="0"/>
-          <a:ext cx="0" cy="0"/>
-          <a:chOff x="0" y="0"/>
-          <a:chExt cx="0" cy="0"/>
-        </a:xfrm>
-      </p:grpSpPr>
       <p:sp>
         <p:nvSpPr>
           <p:cNvPr id="161" name="직사각형 160">
@@ -3873,7 +3669,7 @@
           <a:p>
             <a:r>
               <a:rPr kumimoji="1" lang="en-US" altLang="ko-KR" dirty="0"/>
-              <a:t>• 5</a:t>
+              <a:t>• 4</a:t>
             </a:r>
             <a:r>
               <a:rPr kumimoji="1" lang="ko-KR" altLang="en-US" dirty="0"/>
@@ -3934,7 +3730,7 @@
           <a:p>
             <a:r>
               <a:rPr kumimoji="1" lang="en-US" altLang="ko-KR" dirty="0"/>
-              <a:t>• 5</a:t>
+              <a:t>• 6</a:t>
             </a:r>
             <a:r>
               <a:rPr kumimoji="1" lang="ko-KR" altLang="en-US" dirty="0"/>
@@ -4050,11 +3846,11 @@
           <a:p>
             <a:r>
               <a:rPr kumimoji="1" lang="en-US" altLang="ko-KR" dirty="0"/>
-              <a:t>• 50</a:t>
+              <a:t>• 1</a:t>
             </a:r>
             <a:r>
               <a:rPr kumimoji="1" lang="ko-KR" altLang="en-US" dirty="0"/>
-              <a:t>초 </a:t>
+              <a:t>분 </a:t>
             </a:r>
             <a:endParaRPr kumimoji="1" lang="ko-Kore-KR" altLang="en-US" dirty="0"/>
           </a:p>
@@ -4192,7 +3988,7 @@
           <a:p>
             <a:r>
               <a:rPr kumimoji="1" lang="en-US" altLang="ko-KR" dirty="0"/>
-              <a:t>• 20</a:t>
+              <a:t>• 24</a:t>
             </a:r>
             <a:r>
               <a:rPr kumimoji="1" lang="ko-KR" altLang="en-US" dirty="0"/>
@@ -4313,7 +4109,7 @@
             </a:r>
             <a:r>
               <a:rPr kumimoji="1" lang="en-US" altLang="ko-KR" dirty="0"/>
-              <a:t>48</a:t>
+              <a:t>24</a:t>
             </a:r>
             <a:r>
               <a:rPr kumimoji="1" lang="ko-KR" altLang="en-US" dirty="0"/>
@@ -4336,7 +4132,7 @@
             </a:r>
             <a:r>
               <a:rPr kumimoji="1" lang="en-US" altLang="ko-KR" dirty="0"/>
-              <a:t>24</a:t>
+              <a:t>12</a:t>
             </a:r>
             <a:r>
               <a:rPr kumimoji="1" lang="ko-KR" altLang="en-US" dirty="0"/>
@@ -4433,15 +4229,15 @@
             </a:r>
             <a:r>
               <a:rPr kumimoji="1" lang="en-US" altLang="ko-KR" dirty="0"/>
-              <a:t>50</a:t>
+              <a:t>1</a:t>
             </a:r>
             <a:r>
               <a:rPr kumimoji="1" lang="ko-KR" altLang="en-US" dirty="0"/>
-              <a:t> * </a:t>
+              <a:t>분 * </a:t>
             </a:r>
             <a:r>
               <a:rPr kumimoji="1" lang="en-US" altLang="ko-KR" dirty="0"/>
-              <a:t>24</a:t>
+              <a:t>12</a:t>
             </a:r>
             <a:r>
               <a:rPr kumimoji="1" lang="ko-KR" altLang="en-US" dirty="0"/>
@@ -5170,11 +4966,11 @@
           <a:p>
             <a:r>
               <a:rPr kumimoji="1" lang="en-US" altLang="ko-KR" dirty="0"/>
-              <a:t>• 50</a:t>
+              <a:t>• 1</a:t>
             </a:r>
             <a:r>
               <a:rPr kumimoji="1" lang="ko-KR" altLang="en-US" dirty="0"/>
-              <a:t>초 </a:t>
+              <a:t>분</a:t>
             </a:r>
             <a:endParaRPr kumimoji="1" lang="ko-Kore-KR" altLang="en-US" dirty="0"/>
           </a:p>
@@ -6032,7 +5828,7 @@
 </p:sld>
 </file>
 
-<file path=ppt/slides/slide3.xml><?xml version="1.0" encoding="utf-8"?>
+<file path=ppt/slides/slide2.xml><?xml version="1.0" encoding="utf-8"?>
 <p:sld xmlns:a="http://schemas.openxmlformats.org/drawingml/2006/main" xmlns:r="http://schemas.openxmlformats.org/officeDocument/2006/relationships" xmlns:p="http://schemas.openxmlformats.org/presentationml/2006/main">
   <p:cSld>
     <p:spTree>
@@ -6146,7 +5942,7 @@
         <p:spPr>
           <a:xfrm>
             <a:off x="684184" y="3362654"/>
-            <a:ext cx="989373" cy="553998"/>
+            <a:ext cx="665567" cy="461665"/>
           </a:xfrm>
           <a:prstGeom prst="rect">
             <a:avLst/>
@@ -6160,24 +5956,24 @@
           <a:lstStyle/>
           <a:p>
             <a:r>
-              <a:rPr kumimoji="1" lang="ko-KR" altLang="en-US" sz="1200" dirty="0"/>
-              <a:t>디폴트 상태</a:t>
-            </a:r>
-            <a:endParaRPr kumimoji="1" lang="en-US" altLang="ko-KR" sz="1200" dirty="0"/>
-          </a:p>
-          <a:p>
-            <a:r>
               <a:rPr kumimoji="1" lang="en-US" altLang="ko-KR" sz="1200" dirty="0"/>
-              <a:t>(10</a:t>
+              <a:t>Rest</a:t>
+            </a:r>
+          </a:p>
+          <a:p>
+            <a:r>
+              <a:rPr kumimoji="1" lang="en-US" altLang="ko-KR" sz="1200" dirty="0"/>
+              <a:t>(7~8</a:t>
             </a:r>
             <a:r>
               <a:rPr kumimoji="1" lang="ko-KR" altLang="en-US" sz="1200" dirty="0"/>
               <a:t>분</a:t>
             </a:r>
             <a:r>
-              <a:rPr kumimoji="1" lang="en-US" altLang="ko-KR" dirty="0"/>
+              <a:rPr kumimoji="1" lang="en-US" altLang="ko-KR" sz="1200" dirty="0"/>
               <a:t>)</a:t>
             </a:r>
+            <a:endParaRPr kumimoji="1" lang="en-US" altLang="ko-KR" dirty="0"/>
           </a:p>
         </p:txBody>
       </p:sp>
@@ -6196,7 +5992,7 @@
         <p:spPr>
           <a:xfrm>
             <a:off x="10198907" y="3429000"/>
-            <a:ext cx="989373" cy="553998"/>
+            <a:ext cx="665567" cy="461665"/>
           </a:xfrm>
           <a:prstGeom prst="rect">
             <a:avLst/>
@@ -6210,24 +6006,24 @@
           <a:lstStyle/>
           <a:p>
             <a:r>
-              <a:rPr kumimoji="1" lang="ko-KR" altLang="en-US" sz="1200" dirty="0"/>
-              <a:t>디폴트 상태</a:t>
-            </a:r>
-            <a:endParaRPr kumimoji="1" lang="en-US" altLang="ko-KR" sz="1200" dirty="0"/>
-          </a:p>
-          <a:p>
-            <a:r>
               <a:rPr kumimoji="1" lang="en-US" altLang="ko-KR" sz="1200" dirty="0"/>
-              <a:t>(10</a:t>
+              <a:t>Rest</a:t>
+            </a:r>
+          </a:p>
+          <a:p>
+            <a:r>
+              <a:rPr kumimoji="1" lang="en-US" altLang="ko-KR" sz="1200" dirty="0"/>
+              <a:t>(7~8</a:t>
             </a:r>
             <a:r>
               <a:rPr kumimoji="1" lang="ko-KR" altLang="en-US" sz="1200" dirty="0"/>
               <a:t>분</a:t>
             </a:r>
             <a:r>
-              <a:rPr kumimoji="1" lang="en-US" altLang="ko-KR" dirty="0"/>
+              <a:rPr kumimoji="1" lang="en-US" altLang="ko-KR" sz="1200" dirty="0"/>
               <a:t>)</a:t>
             </a:r>
+            <a:endParaRPr kumimoji="1" lang="en-US" altLang="ko-KR" dirty="0"/>
           </a:p>
         </p:txBody>
       </p:sp>
@@ -6627,7 +6423,7 @@
         </p:nvSpPr>
         <p:spPr>
           <a:xfrm>
-            <a:off x="1832236" y="5050958"/>
+            <a:off x="1563175" y="5074195"/>
             <a:ext cx="4406976" cy="646331"/>
           </a:xfrm>
           <a:prstGeom prst="rect">
@@ -6690,7 +6486,7 @@
             </a:r>
             <a:r>
               <a:rPr kumimoji="1" lang="en-US" altLang="ko-KR" dirty="0"/>
-              <a:t>116</a:t>
+              <a:t>112</a:t>
             </a:r>
             <a:r>
               <a:rPr kumimoji="1" lang="ko-KR" altLang="en-US" dirty="0"/>
@@ -6698,15 +6494,15 @@
             </a:r>
             <a:r>
               <a:rPr kumimoji="1" lang="en-US" altLang="ko-KR" dirty="0"/>
-              <a:t>(</a:t>
+              <a:t>(Rest</a:t>
             </a:r>
             <a:r>
               <a:rPr kumimoji="1" lang="ko-KR" altLang="en-US" dirty="0"/>
-              <a:t>디폴트 상태 </a:t>
+              <a:t> </a:t>
             </a:r>
             <a:r>
               <a:rPr kumimoji="1" lang="en-US" altLang="ko-KR" dirty="0"/>
-              <a:t>20</a:t>
+              <a:t>16</a:t>
             </a:r>
             <a:r>
               <a:rPr kumimoji="1" lang="ko-KR" altLang="en-US" dirty="0"/>
@@ -13800,6 +13596,186 @@
           </a:p>
         </p:txBody>
       </p:sp>
+      <p:sp>
+        <p:nvSpPr>
+          <p:cNvPr id="86" name="직사각형 85">
+            <a:extLst>
+              <a:ext uri="{FF2B5EF4-FFF2-40B4-BE49-F238E27FC236}">
+                <a16:creationId xmlns:a16="http://schemas.microsoft.com/office/drawing/2014/main" id="{C17A0B1D-4193-DE47-8D5A-0A72EE8FE23A}"/>
+              </a:ext>
+            </a:extLst>
+          </p:cNvPr>
+          <p:cNvSpPr/>
+          <p:nvPr/>
+        </p:nvSpPr>
+        <p:spPr>
+          <a:xfrm>
+            <a:off x="1673557" y="1376891"/>
+            <a:ext cx="4163270" cy="3528741"/>
+          </a:xfrm>
+          <a:prstGeom prst="rect">
+            <a:avLst/>
+          </a:prstGeom>
+          <a:noFill/>
+          <a:ln>
+            <a:solidFill>
+              <a:schemeClr val="accent2">
+                <a:lumMod val="75000"/>
+              </a:schemeClr>
+            </a:solidFill>
+          </a:ln>
+        </p:spPr>
+        <p:style>
+          <a:lnRef idx="2">
+            <a:schemeClr val="accent1">
+              <a:shade val="50000"/>
+            </a:schemeClr>
+          </a:lnRef>
+          <a:fillRef idx="1">
+            <a:schemeClr val="accent1"/>
+          </a:fillRef>
+          <a:effectRef idx="0">
+            <a:schemeClr val="accent1"/>
+          </a:effectRef>
+          <a:fontRef idx="minor">
+            <a:schemeClr val="lt1"/>
+          </a:fontRef>
+        </p:style>
+        <p:txBody>
+          <a:bodyPr rtlCol="0" anchor="ctr"/>
+          <a:lstStyle/>
+          <a:p>
+            <a:pPr algn="ctr"/>
+            <a:endParaRPr kumimoji="1" lang="ko-Kore-KR" altLang="en-US" dirty="0"/>
+          </a:p>
+        </p:txBody>
+      </p:sp>
+      <p:sp>
+        <p:nvSpPr>
+          <p:cNvPr id="608" name="직사각형 607">
+            <a:extLst>
+              <a:ext uri="{FF2B5EF4-FFF2-40B4-BE49-F238E27FC236}">
+                <a16:creationId xmlns:a16="http://schemas.microsoft.com/office/drawing/2014/main" id="{26122F7D-F643-8649-8989-3E51B728D977}"/>
+              </a:ext>
+            </a:extLst>
+          </p:cNvPr>
+          <p:cNvSpPr/>
+          <p:nvPr/>
+        </p:nvSpPr>
+        <p:spPr>
+          <a:xfrm>
+            <a:off x="5908373" y="1385754"/>
+            <a:ext cx="4225930" cy="3528741"/>
+          </a:xfrm>
+          <a:prstGeom prst="rect">
+            <a:avLst/>
+          </a:prstGeom>
+          <a:noFill/>
+          <a:ln>
+            <a:solidFill>
+              <a:schemeClr val="accent2">
+                <a:lumMod val="75000"/>
+              </a:schemeClr>
+            </a:solidFill>
+          </a:ln>
+        </p:spPr>
+        <p:style>
+          <a:lnRef idx="2">
+            <a:schemeClr val="accent1">
+              <a:shade val="50000"/>
+            </a:schemeClr>
+          </a:lnRef>
+          <a:fillRef idx="1">
+            <a:schemeClr val="accent1"/>
+          </a:fillRef>
+          <a:effectRef idx="0">
+            <a:schemeClr val="accent1"/>
+          </a:effectRef>
+          <a:fontRef idx="minor">
+            <a:schemeClr val="lt1"/>
+          </a:fontRef>
+        </p:style>
+        <p:txBody>
+          <a:bodyPr rtlCol="0" anchor="ctr"/>
+          <a:lstStyle/>
+          <a:p>
+            <a:pPr algn="ctr"/>
+            <a:endParaRPr kumimoji="1" lang="ko-Kore-KR" altLang="en-US"/>
+          </a:p>
+        </p:txBody>
+      </p:sp>
+      <p:sp>
+        <p:nvSpPr>
+          <p:cNvPr id="88" name="TextBox 87">
+            <a:extLst>
+              <a:ext uri="{FF2B5EF4-FFF2-40B4-BE49-F238E27FC236}">
+                <a16:creationId xmlns:a16="http://schemas.microsoft.com/office/drawing/2014/main" id="{588EB693-0913-BC42-936F-09F3E289B903}"/>
+              </a:ext>
+            </a:extLst>
+          </p:cNvPr>
+          <p:cNvSpPr txBox="1"/>
+          <p:nvPr/>
+        </p:nvSpPr>
+        <p:spPr>
+          <a:xfrm>
+            <a:off x="1656624" y="1039370"/>
+            <a:ext cx="1051891" cy="369332"/>
+          </a:xfrm>
+          <a:prstGeom prst="rect">
+            <a:avLst/>
+          </a:prstGeom>
+          <a:noFill/>
+        </p:spPr>
+        <p:txBody>
+          <a:bodyPr wrap="none" rtlCol="0">
+            <a:spAutoFit/>
+          </a:bodyPr>
+          <a:lstStyle/>
+          <a:p>
+            <a:r>
+              <a:rPr kumimoji="1" lang="en-US" altLang="ko-Kore-KR" dirty="0"/>
+              <a:t>Session 1</a:t>
+            </a:r>
+            <a:endParaRPr kumimoji="1" lang="ko-Kore-KR" altLang="en-US" dirty="0"/>
+          </a:p>
+        </p:txBody>
+      </p:sp>
+      <p:sp>
+        <p:nvSpPr>
+          <p:cNvPr id="609" name="TextBox 608">
+            <a:extLst>
+              <a:ext uri="{FF2B5EF4-FFF2-40B4-BE49-F238E27FC236}">
+                <a16:creationId xmlns:a16="http://schemas.microsoft.com/office/drawing/2014/main" id="{2EE4748E-0F28-B64B-9160-754CD34FA6D2}"/>
+              </a:ext>
+            </a:extLst>
+          </p:cNvPr>
+          <p:cNvSpPr txBox="1"/>
+          <p:nvPr/>
+        </p:nvSpPr>
+        <p:spPr>
+          <a:xfrm>
+            <a:off x="5997975" y="1018774"/>
+            <a:ext cx="1051891" cy="369332"/>
+          </a:xfrm>
+          <a:prstGeom prst="rect">
+            <a:avLst/>
+          </a:prstGeom>
+          <a:noFill/>
+        </p:spPr>
+        <p:txBody>
+          <a:bodyPr wrap="none" rtlCol="0">
+            <a:spAutoFit/>
+          </a:bodyPr>
+          <a:lstStyle/>
+          <a:p>
+            <a:r>
+              <a:rPr kumimoji="1" lang="en-US" altLang="ko-Kore-KR" dirty="0"/>
+              <a:t>Session 2</a:t>
+            </a:r>
+            <a:endParaRPr kumimoji="1" lang="ko-Kore-KR" altLang="en-US" dirty="0"/>
+          </a:p>
+        </p:txBody>
+      </p:sp>
     </p:spTree>
     <p:extLst>
       <p:ext uri="{BB962C8B-B14F-4D97-AF65-F5344CB8AC3E}">

</xml_diff>

<commit_message>
replay jonghyuk behavior experiment
</commit_message>
<xml_diff>
--- a/CLMN/Replay_Exp/blueprint/blueprint_0324.pptx
+++ b/CLMN/Replay_Exp/blueprint/blueprint_0324.pptx
@@ -273,7 +273,7 @@
           <a:p>
             <a:fld id="{1C1A52AB-7B13-A445-A3D7-E082C408E8F4}" type="datetimeFigureOut">
               <a:rPr kumimoji="1" lang="ko-Kore-KR" altLang="en-US" smtClean="0"/>
-              <a:t>2021. 3. 24.</a:t>
+              <a:t>2021. 3. 25.</a:t>
             </a:fld>
             <a:endParaRPr kumimoji="1" lang="ko-Kore-KR" altLang="en-US"/>
           </a:p>
@@ -473,7 +473,7 @@
           <a:p>
             <a:fld id="{1C1A52AB-7B13-A445-A3D7-E082C408E8F4}" type="datetimeFigureOut">
               <a:rPr kumimoji="1" lang="ko-Kore-KR" altLang="en-US" smtClean="0"/>
-              <a:t>2021. 3. 24.</a:t>
+              <a:t>2021. 3. 25.</a:t>
             </a:fld>
             <a:endParaRPr kumimoji="1" lang="ko-Kore-KR" altLang="en-US"/>
           </a:p>
@@ -683,7 +683,7 @@
           <a:p>
             <a:fld id="{1C1A52AB-7B13-A445-A3D7-E082C408E8F4}" type="datetimeFigureOut">
               <a:rPr kumimoji="1" lang="ko-Kore-KR" altLang="en-US" smtClean="0"/>
-              <a:t>2021. 3. 24.</a:t>
+              <a:t>2021. 3. 25.</a:t>
             </a:fld>
             <a:endParaRPr kumimoji="1" lang="ko-Kore-KR" altLang="en-US"/>
           </a:p>
@@ -883,7 +883,7 @@
           <a:p>
             <a:fld id="{1C1A52AB-7B13-A445-A3D7-E082C408E8F4}" type="datetimeFigureOut">
               <a:rPr kumimoji="1" lang="ko-Kore-KR" altLang="en-US" smtClean="0"/>
-              <a:t>2021. 3. 24.</a:t>
+              <a:t>2021. 3. 25.</a:t>
             </a:fld>
             <a:endParaRPr kumimoji="1" lang="ko-Kore-KR" altLang="en-US"/>
           </a:p>
@@ -1159,7 +1159,7 @@
           <a:p>
             <a:fld id="{1C1A52AB-7B13-A445-A3D7-E082C408E8F4}" type="datetimeFigureOut">
               <a:rPr kumimoji="1" lang="ko-Kore-KR" altLang="en-US" smtClean="0"/>
-              <a:t>2021. 3. 24.</a:t>
+              <a:t>2021. 3. 25.</a:t>
             </a:fld>
             <a:endParaRPr kumimoji="1" lang="ko-Kore-KR" altLang="en-US"/>
           </a:p>
@@ -1427,7 +1427,7 @@
           <a:p>
             <a:fld id="{1C1A52AB-7B13-A445-A3D7-E082C408E8F4}" type="datetimeFigureOut">
               <a:rPr kumimoji="1" lang="ko-Kore-KR" altLang="en-US" smtClean="0"/>
-              <a:t>2021. 3. 24.</a:t>
+              <a:t>2021. 3. 25.</a:t>
             </a:fld>
             <a:endParaRPr kumimoji="1" lang="ko-Kore-KR" altLang="en-US"/>
           </a:p>
@@ -1842,7 +1842,7 @@
           <a:p>
             <a:fld id="{1C1A52AB-7B13-A445-A3D7-E082C408E8F4}" type="datetimeFigureOut">
               <a:rPr kumimoji="1" lang="ko-Kore-KR" altLang="en-US" smtClean="0"/>
-              <a:t>2021. 3. 24.</a:t>
+              <a:t>2021. 3. 25.</a:t>
             </a:fld>
             <a:endParaRPr kumimoji="1" lang="ko-Kore-KR" altLang="en-US"/>
           </a:p>
@@ -1984,7 +1984,7 @@
           <a:p>
             <a:fld id="{1C1A52AB-7B13-A445-A3D7-E082C408E8F4}" type="datetimeFigureOut">
               <a:rPr kumimoji="1" lang="ko-Kore-KR" altLang="en-US" smtClean="0"/>
-              <a:t>2021. 3. 24.</a:t>
+              <a:t>2021. 3. 25.</a:t>
             </a:fld>
             <a:endParaRPr kumimoji="1" lang="ko-Kore-KR" altLang="en-US"/>
           </a:p>
@@ -2097,7 +2097,7 @@
           <a:p>
             <a:fld id="{1C1A52AB-7B13-A445-A3D7-E082C408E8F4}" type="datetimeFigureOut">
               <a:rPr kumimoji="1" lang="ko-Kore-KR" altLang="en-US" smtClean="0"/>
-              <a:t>2021. 3. 24.</a:t>
+              <a:t>2021. 3. 25.</a:t>
             </a:fld>
             <a:endParaRPr kumimoji="1" lang="ko-Kore-KR" altLang="en-US"/>
           </a:p>
@@ -2410,7 +2410,7 @@
           <a:p>
             <a:fld id="{1C1A52AB-7B13-A445-A3D7-E082C408E8F4}" type="datetimeFigureOut">
               <a:rPr kumimoji="1" lang="ko-Kore-KR" altLang="en-US" smtClean="0"/>
-              <a:t>2021. 3. 24.</a:t>
+              <a:t>2021. 3. 25.</a:t>
             </a:fld>
             <a:endParaRPr kumimoji="1" lang="ko-Kore-KR" altLang="en-US"/>
           </a:p>
@@ -2699,7 +2699,7 @@
           <a:p>
             <a:fld id="{1C1A52AB-7B13-A445-A3D7-E082C408E8F4}" type="datetimeFigureOut">
               <a:rPr kumimoji="1" lang="ko-Kore-KR" altLang="en-US" smtClean="0"/>
-              <a:t>2021. 3. 24.</a:t>
+              <a:t>2021. 3. 25.</a:t>
             </a:fld>
             <a:endParaRPr kumimoji="1" lang="ko-Kore-KR" altLang="en-US"/>
           </a:p>
@@ -2942,7 +2942,7 @@
           <a:p>
             <a:fld id="{1C1A52AB-7B13-A445-A3D7-E082C408E8F4}" type="datetimeFigureOut">
               <a:rPr kumimoji="1" lang="ko-Kore-KR" altLang="en-US" smtClean="0"/>
-              <a:t>2021. 3. 24.</a:t>
+              <a:t>2021. 3. 25.</a:t>
             </a:fld>
             <a:endParaRPr kumimoji="1" lang="ko-Kore-KR" altLang="en-US"/>
           </a:p>
@@ -3669,7 +3669,7 @@
           <a:p>
             <a:r>
               <a:rPr kumimoji="1" lang="en-US" altLang="ko-KR" dirty="0"/>
-              <a:t>• 4</a:t>
+              <a:t>• 6</a:t>
             </a:r>
             <a:r>
               <a:rPr kumimoji="1" lang="ko-KR" altLang="en-US" dirty="0"/>

</xml_diff>